<commit_message>
Minor change in powerpoint
</commit_message>
<xml_diff>
--- a/Atlas.pptx
+++ b/Atlas.pptx
@@ -449,7 +449,7 @@
           <a:p>
             <a:fld id="{C104FF54-018A-427D-8C3B-D9A3981A5BBD}" type="datetimeFigureOut">
               <a:rPr lang="en-US" smtClean="0"/>
-              <a:t>06-Dec-16</a:t>
+              <a:t>12/8/2016</a:t>
             </a:fld>
             <a:endParaRPr lang="en-US"/>
           </a:p>
@@ -773,7 +773,7 @@
           <a:p>
             <a:fld id="{C104FF54-018A-427D-8C3B-D9A3981A5BBD}" type="datetimeFigureOut">
               <a:rPr lang="en-US" smtClean="0"/>
-              <a:t>06-Dec-16</a:t>
+              <a:t>12/8/2016</a:t>
             </a:fld>
             <a:endParaRPr lang="en-US"/>
           </a:p>
@@ -1021,7 +1021,7 @@
           <a:p>
             <a:fld id="{C104FF54-018A-427D-8C3B-D9A3981A5BBD}" type="datetimeFigureOut">
               <a:rPr lang="en-US" smtClean="0"/>
-              <a:t>06-Dec-16</a:t>
+              <a:t>12/8/2016</a:t>
             </a:fld>
             <a:endParaRPr lang="en-US"/>
           </a:p>
@@ -1360,7 +1360,7 @@
           <a:p>
             <a:fld id="{C104FF54-018A-427D-8C3B-D9A3981A5BBD}" type="datetimeFigureOut">
               <a:rPr lang="en-US" smtClean="0"/>
-              <a:t>06-Dec-16</a:t>
+              <a:t>12/8/2016</a:t>
             </a:fld>
             <a:endParaRPr lang="en-US"/>
           </a:p>
@@ -1707,7 +1707,7 @@
           <a:p>
             <a:fld id="{C104FF54-018A-427D-8C3B-D9A3981A5BBD}" type="datetimeFigureOut">
               <a:rPr lang="en-US" smtClean="0"/>
-              <a:t>06-Dec-16</a:t>
+              <a:t>12/8/2016</a:t>
             </a:fld>
             <a:endParaRPr lang="en-US"/>
           </a:p>
@@ -2081,7 +2081,7 @@
           <a:p>
             <a:fld id="{C104FF54-018A-427D-8C3B-D9A3981A5BBD}" type="datetimeFigureOut">
               <a:rPr lang="en-US" smtClean="0"/>
-              <a:t>06-Dec-16</a:t>
+              <a:t>12/8/2016</a:t>
             </a:fld>
             <a:endParaRPr lang="en-US"/>
           </a:p>
@@ -2551,7 +2551,7 @@
           <a:p>
             <a:fld id="{C104FF54-018A-427D-8C3B-D9A3981A5BBD}" type="datetimeFigureOut">
               <a:rPr lang="en-US" smtClean="0"/>
-              <a:t>06-Dec-16</a:t>
+              <a:t>12/8/2016</a:t>
             </a:fld>
             <a:endParaRPr lang="en-US"/>
           </a:p>
@@ -2756,7 +2756,7 @@
           <a:p>
             <a:fld id="{C104FF54-018A-427D-8C3B-D9A3981A5BBD}" type="datetimeFigureOut">
               <a:rPr lang="en-US" smtClean="0"/>
-              <a:t>06-Dec-16</a:t>
+              <a:t>12/8/2016</a:t>
             </a:fld>
             <a:endParaRPr lang="en-US"/>
           </a:p>
@@ -2967,7 +2967,7 @@
           <a:p>
             <a:fld id="{C104FF54-018A-427D-8C3B-D9A3981A5BBD}" type="datetimeFigureOut">
               <a:rPr lang="en-US" smtClean="0"/>
-              <a:t>06-Dec-16</a:t>
+              <a:t>12/8/2016</a:t>
             </a:fld>
             <a:endParaRPr lang="en-US"/>
           </a:p>
@@ -3199,7 +3199,7 @@
           <a:p>
             <a:fld id="{C104FF54-018A-427D-8C3B-D9A3981A5BBD}" type="datetimeFigureOut">
               <a:rPr lang="en-US" smtClean="0"/>
-              <a:t>06-Dec-16</a:t>
+              <a:t>12/8/2016</a:t>
             </a:fld>
             <a:endParaRPr lang="en-US"/>
           </a:p>
@@ -3447,7 +3447,7 @@
           <a:p>
             <a:fld id="{C104FF54-018A-427D-8C3B-D9A3981A5BBD}" type="datetimeFigureOut">
               <a:rPr lang="en-US" smtClean="0"/>
-              <a:t>06-Dec-16</a:t>
+              <a:t>12/8/2016</a:t>
             </a:fld>
             <a:endParaRPr lang="en-US"/>
           </a:p>
@@ -3745,7 +3745,7 @@
           <a:p>
             <a:fld id="{C104FF54-018A-427D-8C3B-D9A3981A5BBD}" type="datetimeFigureOut">
               <a:rPr lang="en-US" smtClean="0"/>
-              <a:t>06-Dec-16</a:t>
+              <a:t>12/8/2016</a:t>
             </a:fld>
             <a:endParaRPr lang="en-US"/>
           </a:p>
@@ -4139,7 +4139,7 @@
           <a:p>
             <a:fld id="{C104FF54-018A-427D-8C3B-D9A3981A5BBD}" type="datetimeFigureOut">
               <a:rPr lang="en-US" smtClean="0"/>
-              <a:t>06-Dec-16</a:t>
+              <a:t>12/8/2016</a:t>
             </a:fld>
             <a:endParaRPr lang="en-US"/>
           </a:p>
@@ -4288,7 +4288,7 @@
           <a:p>
             <a:fld id="{C104FF54-018A-427D-8C3B-D9A3981A5BBD}" type="datetimeFigureOut">
               <a:rPr lang="en-US" smtClean="0"/>
-              <a:t>06-Dec-16</a:t>
+              <a:t>12/8/2016</a:t>
             </a:fld>
             <a:endParaRPr lang="en-US"/>
           </a:p>
@@ -4414,7 +4414,7 @@
           <a:p>
             <a:fld id="{C104FF54-018A-427D-8C3B-D9A3981A5BBD}" type="datetimeFigureOut">
               <a:rPr lang="en-US" smtClean="0"/>
-              <a:t>06-Dec-16</a:t>
+              <a:t>12/8/2016</a:t>
             </a:fld>
             <a:endParaRPr lang="en-US"/>
           </a:p>
@@ -4669,7 +4669,7 @@
           <a:p>
             <a:fld id="{C104FF54-018A-427D-8C3B-D9A3981A5BBD}" type="datetimeFigureOut">
               <a:rPr lang="en-US" smtClean="0"/>
-              <a:t>06-Dec-16</a:t>
+              <a:t>12/8/2016</a:t>
             </a:fld>
             <a:endParaRPr lang="en-US"/>
           </a:p>
@@ -4984,7 +4984,7 @@
           <a:p>
             <a:fld id="{C104FF54-018A-427D-8C3B-D9A3981A5BBD}" type="datetimeFigureOut">
               <a:rPr lang="en-US" smtClean="0"/>
-              <a:t>06-Dec-16</a:t>
+              <a:t>12/8/2016</a:t>
             </a:fld>
             <a:endParaRPr lang="en-US"/>
           </a:p>
@@ -5335,7 +5335,7 @@
           <a:p>
             <a:fld id="{C104FF54-018A-427D-8C3B-D9A3981A5BBD}" type="datetimeFigureOut">
               <a:rPr lang="en-US" smtClean="0"/>
-              <a:t>06-Dec-16</a:t>
+              <a:t>12/8/2016</a:t>
             </a:fld>
             <a:endParaRPr lang="en-US"/>
           </a:p>
@@ -6977,6 +6977,13 @@
           <a:lstStyle/>
           <a:p>
             <a:r>
+              <a:rPr lang="fi-FI" smtClean="0"/>
+              <a:t>Visual Studio</a:t>
+            </a:r>
+            <a:endParaRPr lang="en-US" smtClean="0"/>
+          </a:p>
+          <a:p>
+            <a:r>
               <a:rPr lang="en-US" dirty="0" err="1" smtClean="0"/>
               <a:t>MarkedNet</a:t>
             </a:r>

</xml_diff>

<commit_message>
Minor addition to powerpoint
</commit_message>
<xml_diff>
--- a/Atlas.pptx
+++ b/Atlas.pptx
@@ -6973,12 +6973,28 @@
         </p:nvSpPr>
         <p:spPr/>
         <p:txBody>
-          <a:bodyPr/>
-          <a:lstStyle/>
-          <a:p>
+          <a:bodyPr>
+            <a:normAutofit lnSpcReduction="10000"/>
+          </a:bodyPr>
+          <a:lstStyle/>
+          <a:p>
+            <a:r>
+              <a:rPr lang="fi-FI" dirty="0" smtClean="0"/>
+              <a:t>Visual </a:t>
+            </a:r>
+            <a:r>
+              <a:rPr lang="fi-FI" dirty="0" smtClean="0"/>
+              <a:t>Studio</a:t>
+            </a:r>
+          </a:p>
+          <a:p>
+            <a:r>
+              <a:rPr lang="fi-FI" dirty="0" err="1" smtClean="0"/>
+              <a:t>Entity</a:t>
+            </a:r>
             <a:r>
               <a:rPr lang="fi-FI" smtClean="0"/>
-              <a:t>Visual Studio</a:t>
+              <a:t> Framework</a:t>
             </a:r>
             <a:endParaRPr lang="en-US" smtClean="0"/>
           </a:p>

</xml_diff>